<commit_message>
final push : code + Präsi
</commit_message>
<xml_diff>
--- a/steganographie/Steganographie.pptx
+++ b/steganographie/Steganographie.pptx
@@ -5,17 +5,20 @@
     <p:sldMasterId id="2147483666" r:id="rId4"/>
   </p:sldMasterIdLst>
   <p:notesMasterIdLst>
-    <p:notesMasterId r:id="rId10"/>
+    <p:notesMasterId r:id="rId13"/>
   </p:notesMasterIdLst>
   <p:handoutMasterIdLst>
-    <p:handoutMasterId r:id="rId11"/>
+    <p:handoutMasterId r:id="rId14"/>
   </p:handoutMasterIdLst>
   <p:sldIdLst>
     <p:sldId id="256" r:id="rId5"/>
     <p:sldId id="277" r:id="rId6"/>
     <p:sldId id="278" r:id="rId7"/>
     <p:sldId id="279" r:id="rId8"/>
-    <p:sldId id="276" r:id="rId9"/>
+    <p:sldId id="280" r:id="rId9"/>
+    <p:sldId id="281" r:id="rId10"/>
+    <p:sldId id="282" r:id="rId11"/>
+    <p:sldId id="276" r:id="rId12"/>
   </p:sldIdLst>
   <p:sldSz cx="12192000" cy="6858000"/>
   <p:notesSz cx="6858000" cy="9144000"/>
@@ -1158,7 +1161,7 @@
             <a:pPr rtl="0"/>
             <a:fld id="{D4B9A9E5-4F7F-4A7D-9DE1-899232329269}" type="slidenum">
               <a:rPr lang="de-DE" smtClean="0"/>
-              <a:t>5</a:t>
+              <a:t>8</a:t>
             </a:fld>
             <a:endParaRPr lang="de-DE"/>
           </a:p>
@@ -16674,18 +16677,18 @@
       </p:sp>
       <p:sp>
         <p:nvSpPr>
-          <p:cNvPr id="6" name="Datumsplatzhalter 5">
-            <a:extLst>
-              <a:ext uri="{FF2B5EF4-FFF2-40B4-BE49-F238E27FC236}">
-                <a16:creationId xmlns:a16="http://schemas.microsoft.com/office/drawing/2014/main" id="{B69DF042-37C5-4E09-AA4C-AA66649C9533}"/>
-              </a:ext>
-            </a:extLst>
-          </p:cNvPr>
-          <p:cNvSpPr>
-            <a:spLocks noGrp="1"/>
-          </p:cNvSpPr>
-          <p:nvPr>
-            <p:ph type="dt" sz="half" idx="10"/>
+          <p:cNvPr id="5" name="Fußzeilenplatzhalter 4">
+            <a:extLst>
+              <a:ext uri="{FF2B5EF4-FFF2-40B4-BE49-F238E27FC236}">
+                <a16:creationId xmlns:a16="http://schemas.microsoft.com/office/drawing/2014/main" id="{AF29EA23-F34E-486A-B8B2-0C3019266975}"/>
+              </a:ext>
+            </a:extLst>
+          </p:cNvPr>
+          <p:cNvSpPr>
+            <a:spLocks noGrp="1"/>
+          </p:cNvSpPr>
+          <p:nvPr>
+            <p:ph type="ftr" sz="quarter" idx="11"/>
           </p:nvPr>
         </p:nvSpPr>
         <p:spPr/>
@@ -16693,39 +16696,9 @@
           <a:bodyPr rtlCol="0"/>
           <a:lstStyle/>
           <a:p>
-            <a:pPr rtl="0"/>
-            <a:r>
-              <a:rPr lang="de-DE"/>
-              <a:t>20XX</a:t>
-            </a:r>
-          </a:p>
-        </p:txBody>
-      </p:sp>
-      <p:sp>
-        <p:nvSpPr>
-          <p:cNvPr id="5" name="Fußzeilenplatzhalter 4">
-            <a:extLst>
-              <a:ext uri="{FF2B5EF4-FFF2-40B4-BE49-F238E27FC236}">
-                <a16:creationId xmlns:a16="http://schemas.microsoft.com/office/drawing/2014/main" id="{AF29EA23-F34E-486A-B8B2-0C3019266975}"/>
-              </a:ext>
-            </a:extLst>
-          </p:cNvPr>
-          <p:cNvSpPr>
-            <a:spLocks noGrp="1"/>
-          </p:cNvSpPr>
-          <p:nvPr>
-            <p:ph type="ftr" sz="quarter" idx="11"/>
-          </p:nvPr>
-        </p:nvSpPr>
-        <p:spPr/>
-        <p:txBody>
-          <a:bodyPr rtlCol="0"/>
-          <a:lstStyle/>
-          <a:p>
-            <a:pPr rtl="0"/>
-            <a:r>
-              <a:rPr lang="de-DE"/>
-              <a:t>Verkaufspräsentation</a:t>
+            <a:r>
+              <a:rPr lang="de-DE" dirty="0"/>
+              <a:t>Steganographie</a:t>
             </a:r>
           </a:p>
         </p:txBody>
@@ -16861,18 +16834,18 @@
       </p:sp>
       <p:sp>
         <p:nvSpPr>
-          <p:cNvPr id="4" name="Datumsplatzhalter 3">
-            <a:extLst>
-              <a:ext uri="{FF2B5EF4-FFF2-40B4-BE49-F238E27FC236}">
-                <a16:creationId xmlns:a16="http://schemas.microsoft.com/office/drawing/2014/main" id="{D2330F9F-49EE-A209-4000-DC3398805345}"/>
-              </a:ext>
-            </a:extLst>
-          </p:cNvPr>
-          <p:cNvSpPr>
-            <a:spLocks noGrp="1"/>
-          </p:cNvSpPr>
-          <p:nvPr>
-            <p:ph type="dt" sz="half" idx="10"/>
+          <p:cNvPr id="5" name="Fußzeilenplatzhalter 4">
+            <a:extLst>
+              <a:ext uri="{FF2B5EF4-FFF2-40B4-BE49-F238E27FC236}">
+                <a16:creationId xmlns:a16="http://schemas.microsoft.com/office/drawing/2014/main" id="{6DA63001-89A8-F258-F143-DAD8A1970FDB}"/>
+              </a:ext>
+            </a:extLst>
+          </p:cNvPr>
+          <p:cNvSpPr>
+            <a:spLocks noGrp="1"/>
+          </p:cNvSpPr>
+          <p:nvPr>
+            <p:ph type="ftr" sz="quarter" idx="11"/>
           </p:nvPr>
         </p:nvSpPr>
         <p:spPr/>
@@ -16880,40 +16853,11 @@
           <a:bodyPr/>
           <a:lstStyle/>
           <a:p>
-            <a:pPr rtl="0"/>
-            <a:r>
-              <a:rPr lang="de-DE" noProof="0"/>
-              <a:t>20XX</a:t>
-            </a:r>
-          </a:p>
-        </p:txBody>
-      </p:sp>
-      <p:sp>
-        <p:nvSpPr>
-          <p:cNvPr id="5" name="Fußzeilenplatzhalter 4">
-            <a:extLst>
-              <a:ext uri="{FF2B5EF4-FFF2-40B4-BE49-F238E27FC236}">
-                <a16:creationId xmlns:a16="http://schemas.microsoft.com/office/drawing/2014/main" id="{6DA63001-89A8-F258-F143-DAD8A1970FDB}"/>
-              </a:ext>
-            </a:extLst>
-          </p:cNvPr>
-          <p:cNvSpPr>
-            <a:spLocks noGrp="1"/>
-          </p:cNvSpPr>
-          <p:nvPr>
-            <p:ph type="ftr" sz="quarter" idx="11"/>
-          </p:nvPr>
-        </p:nvSpPr>
-        <p:spPr/>
-        <p:txBody>
-          <a:bodyPr/>
-          <a:lstStyle/>
-          <a:p>
-            <a:pPr rtl="0"/>
-            <a:r>
-              <a:rPr lang="de-DE" noProof="0"/>
-              <a:t>Verkaufspräsentation</a:t>
-            </a:r>
+            <a:r>
+              <a:rPr lang="de-DE" dirty="0"/>
+              <a:t>Steganographie</a:t>
+            </a:r>
+            <a:endParaRPr lang="de-DE" noProof="0" dirty="0"/>
           </a:p>
         </p:txBody>
       </p:sp>
@@ -16998,7 +16942,42 @@
           <a:bodyPr/>
           <a:lstStyle/>
           <a:p>
-            <a:endParaRPr lang="de-DE"/>
+            <a:r>
+              <a:rPr lang="de-DE" dirty="0"/>
+              <a:t>Das Programm dient zu:</a:t>
+            </a:r>
+          </a:p>
+          <a:p>
+            <a:r>
+              <a:rPr lang="de-DE" dirty="0"/>
+              <a:t>Ein Bild zu laden (.</a:t>
+            </a:r>
+            <a:r>
+              <a:rPr lang="de-DE" dirty="0" err="1"/>
+              <a:t>png</a:t>
+            </a:r>
+            <a:r>
+              <a:rPr lang="de-DE" dirty="0"/>
+              <a:t>-Typ)</a:t>
+            </a:r>
+          </a:p>
+          <a:p>
+            <a:r>
+              <a:rPr lang="de-DE" dirty="0"/>
+              <a:t>Die verstecke Bits zu entdecken und auflisten.</a:t>
+            </a:r>
+          </a:p>
+          <a:p>
+            <a:r>
+              <a:rPr lang="de-DE" dirty="0"/>
+              <a:t>Binäre Daten zu Zeichen zusammenfügen (ASCII-Zeichen)</a:t>
+            </a:r>
+          </a:p>
+          <a:p>
+            <a:r>
+              <a:rPr lang="de-DE" dirty="0"/>
+              <a:t>Die versteckte Nachricht anzuzeigen.</a:t>
+            </a:r>
           </a:p>
         </p:txBody>
       </p:sp>
@@ -17036,18 +17015,18 @@
       </p:sp>
       <p:sp>
         <p:nvSpPr>
-          <p:cNvPr id="4" name="Datumsplatzhalter 3">
-            <a:extLst>
-              <a:ext uri="{FF2B5EF4-FFF2-40B4-BE49-F238E27FC236}">
-                <a16:creationId xmlns:a16="http://schemas.microsoft.com/office/drawing/2014/main" id="{1D909FE0-940F-B919-6FD2-F5E6E98B849A}"/>
-              </a:ext>
-            </a:extLst>
-          </p:cNvPr>
-          <p:cNvSpPr>
-            <a:spLocks noGrp="1"/>
-          </p:cNvSpPr>
-          <p:nvPr>
-            <p:ph type="dt" sz="half" idx="10"/>
+          <p:cNvPr id="5" name="Fußzeilenplatzhalter 4">
+            <a:extLst>
+              <a:ext uri="{FF2B5EF4-FFF2-40B4-BE49-F238E27FC236}">
+                <a16:creationId xmlns:a16="http://schemas.microsoft.com/office/drawing/2014/main" id="{F9F6F306-245A-7338-6999-894367133B4D}"/>
+              </a:ext>
+            </a:extLst>
+          </p:cNvPr>
+          <p:cNvSpPr>
+            <a:spLocks noGrp="1"/>
+          </p:cNvSpPr>
+          <p:nvPr>
+            <p:ph type="ftr" sz="quarter" idx="11"/>
           </p:nvPr>
         </p:nvSpPr>
         <p:spPr/>
@@ -17055,40 +17034,11 @@
           <a:bodyPr/>
           <a:lstStyle/>
           <a:p>
-            <a:pPr rtl="0"/>
-            <a:r>
-              <a:rPr lang="de-DE" noProof="0"/>
-              <a:t>20XX</a:t>
-            </a:r>
-          </a:p>
-        </p:txBody>
-      </p:sp>
-      <p:sp>
-        <p:nvSpPr>
-          <p:cNvPr id="5" name="Fußzeilenplatzhalter 4">
-            <a:extLst>
-              <a:ext uri="{FF2B5EF4-FFF2-40B4-BE49-F238E27FC236}">
-                <a16:creationId xmlns:a16="http://schemas.microsoft.com/office/drawing/2014/main" id="{F9F6F306-245A-7338-6999-894367133B4D}"/>
-              </a:ext>
-            </a:extLst>
-          </p:cNvPr>
-          <p:cNvSpPr>
-            <a:spLocks noGrp="1"/>
-          </p:cNvSpPr>
-          <p:nvPr>
-            <p:ph type="ftr" sz="quarter" idx="11"/>
-          </p:nvPr>
-        </p:nvSpPr>
-        <p:spPr/>
-        <p:txBody>
-          <a:bodyPr/>
-          <a:lstStyle/>
-          <a:p>
-            <a:pPr rtl="0"/>
-            <a:r>
-              <a:rPr lang="de-DE" noProof="0"/>
-              <a:t>Verkaufspräsentation</a:t>
-            </a:r>
+            <a:r>
+              <a:rPr lang="de-DE" dirty="0"/>
+              <a:t>Steganographie</a:t>
+            </a:r>
+            <a:endParaRPr lang="de-DE" noProof="0" dirty="0"/>
           </a:p>
         </p:txBody>
       </p:sp>
@@ -17154,6 +17104,596 @@
       </p:grpSpPr>
       <p:sp>
         <p:nvSpPr>
+          <p:cNvPr id="2" name="SmartArt-Platzhalter 1">
+            <a:extLst>
+              <a:ext uri="{FF2B5EF4-FFF2-40B4-BE49-F238E27FC236}">
+                <a16:creationId xmlns:a16="http://schemas.microsoft.com/office/drawing/2014/main" id="{EBE95072-7BF1-BCCC-4673-951ECD57588E}"/>
+              </a:ext>
+            </a:extLst>
+          </p:cNvPr>
+          <p:cNvSpPr>
+            <a:spLocks noGrp="1"/>
+          </p:cNvSpPr>
+          <p:nvPr>
+            <p:ph type="dgm" sz="quarter" idx="15"/>
+          </p:nvPr>
+        </p:nvSpPr>
+        <p:spPr>
+          <a:xfrm>
+            <a:off x="603773" y="1255518"/>
+            <a:ext cx="10382026" cy="961425"/>
+          </a:xfrm>
+        </p:spPr>
+        <p:txBody>
+          <a:bodyPr>
+            <a:noAutofit/>
+          </a:bodyPr>
+          <a:lstStyle/>
+          <a:p>
+            <a:r>
+              <a:rPr lang="de-DE" sz="1600" dirty="0"/>
+              <a:t>Jedes Pixel durchgehen</a:t>
+            </a:r>
+          </a:p>
+          <a:p>
+            <a:r>
+              <a:rPr lang="de-DE" sz="1600" dirty="0"/>
+              <a:t>Holt das letzte geänderte Bit der RGB</a:t>
+            </a:r>
+          </a:p>
+          <a:p>
+            <a:r>
+              <a:rPr lang="de-DE" sz="1600" dirty="0"/>
+              <a:t>Wandelt 8 Bits in ein Zeichen um</a:t>
+            </a:r>
+          </a:p>
+          <a:p>
+            <a:r>
+              <a:rPr lang="de-DE" sz="1600" dirty="0"/>
+              <a:t>Stoppt bei „#“</a:t>
+            </a:r>
+          </a:p>
+        </p:txBody>
+      </p:sp>
+      <p:sp>
+        <p:nvSpPr>
+          <p:cNvPr id="3" name="Titel 2">
+            <a:extLst>
+              <a:ext uri="{FF2B5EF4-FFF2-40B4-BE49-F238E27FC236}">
+                <a16:creationId xmlns:a16="http://schemas.microsoft.com/office/drawing/2014/main" id="{1FCECBCE-E4E0-C9D7-4BB9-FDBFE1A42B80}"/>
+              </a:ext>
+            </a:extLst>
+          </p:cNvPr>
+          <p:cNvSpPr>
+            <a:spLocks noGrp="1"/>
+          </p:cNvSpPr>
+          <p:nvPr>
+            <p:ph type="title"/>
+          </p:nvPr>
+        </p:nvSpPr>
+        <p:spPr/>
+        <p:txBody>
+          <a:bodyPr/>
+          <a:lstStyle/>
+          <a:p>
+            <a:r>
+              <a:rPr lang="de-DE" dirty="0"/>
+              <a:t>Code </a:t>
+            </a:r>
+          </a:p>
+        </p:txBody>
+      </p:sp>
+      <p:sp>
+        <p:nvSpPr>
+          <p:cNvPr id="5" name="Fußzeilenplatzhalter 4">
+            <a:extLst>
+              <a:ext uri="{FF2B5EF4-FFF2-40B4-BE49-F238E27FC236}">
+                <a16:creationId xmlns:a16="http://schemas.microsoft.com/office/drawing/2014/main" id="{A59AA46F-0C37-2518-1119-330393F27088}"/>
+              </a:ext>
+            </a:extLst>
+          </p:cNvPr>
+          <p:cNvSpPr>
+            <a:spLocks noGrp="1"/>
+          </p:cNvSpPr>
+          <p:nvPr>
+            <p:ph type="ftr" sz="quarter" idx="11"/>
+          </p:nvPr>
+        </p:nvSpPr>
+        <p:spPr/>
+        <p:txBody>
+          <a:bodyPr/>
+          <a:lstStyle/>
+          <a:p>
+            <a:r>
+              <a:rPr lang="de-DE" dirty="0"/>
+              <a:t>Steganographie</a:t>
+            </a:r>
+            <a:endParaRPr lang="de-DE" noProof="0" dirty="0"/>
+          </a:p>
+        </p:txBody>
+      </p:sp>
+      <p:sp>
+        <p:nvSpPr>
+          <p:cNvPr id="6" name="Foliennummernplatzhalter 5">
+            <a:extLst>
+              <a:ext uri="{FF2B5EF4-FFF2-40B4-BE49-F238E27FC236}">
+                <a16:creationId xmlns:a16="http://schemas.microsoft.com/office/drawing/2014/main" id="{A1535F70-5A9A-4F45-F62B-65126EDEA357}"/>
+              </a:ext>
+            </a:extLst>
+          </p:cNvPr>
+          <p:cNvSpPr>
+            <a:spLocks noGrp="1"/>
+          </p:cNvSpPr>
+          <p:nvPr>
+            <p:ph type="sldNum" sz="quarter" idx="12"/>
+          </p:nvPr>
+        </p:nvSpPr>
+        <p:spPr/>
+        <p:txBody>
+          <a:bodyPr/>
+          <a:lstStyle/>
+          <a:p>
+            <a:pPr rtl="0"/>
+            <a:fld id="{B5CEABB6-07DC-46E8-9B57-56EC44A396E5}" type="slidenum">
+              <a:rPr lang="de-DE" noProof="0" smtClean="0"/>
+              <a:t>5</a:t>
+            </a:fld>
+            <a:endParaRPr lang="de-DE" noProof="0"/>
+          </a:p>
+        </p:txBody>
+      </p:sp>
+      <p:pic>
+        <p:nvPicPr>
+          <p:cNvPr id="8" name="Grafik 7" descr="Ein Bild, das Text, Screenshot enthält.&#10;&#10;KI-generierte Inhalte können fehlerhaft sein.">
+            <a:extLst>
+              <a:ext uri="{FF2B5EF4-FFF2-40B4-BE49-F238E27FC236}">
+                <a16:creationId xmlns:a16="http://schemas.microsoft.com/office/drawing/2014/main" id="{E0D64586-7DF3-7D13-B90B-0E62B115F8EA}"/>
+              </a:ext>
+            </a:extLst>
+          </p:cNvPr>
+          <p:cNvPicPr>
+            <a:picLocks noChangeAspect="1"/>
+          </p:cNvPicPr>
+          <p:nvPr/>
+        </p:nvPicPr>
+        <p:blipFill>
+          <a:blip r:embed="rId2"/>
+          <a:stretch>
+            <a:fillRect/>
+          </a:stretch>
+        </p:blipFill>
+        <p:spPr>
+          <a:xfrm>
+            <a:off x="0" y="2581080"/>
+            <a:ext cx="8610600" cy="4276919"/>
+          </a:xfrm>
+          <a:prstGeom prst="rect">
+            <a:avLst/>
+          </a:prstGeom>
+        </p:spPr>
+      </p:pic>
+      <p:pic>
+        <p:nvPicPr>
+          <p:cNvPr id="10" name="Grafik 9" descr="Ein Bild, das Text, Screenshot, Schrift enthält.&#10;&#10;KI-generierte Inhalte können fehlerhaft sein.">
+            <a:extLst>
+              <a:ext uri="{FF2B5EF4-FFF2-40B4-BE49-F238E27FC236}">
+                <a16:creationId xmlns:a16="http://schemas.microsoft.com/office/drawing/2014/main" id="{C0C19449-D973-8D8A-8E4B-3BAE675DA4FA}"/>
+              </a:ext>
+            </a:extLst>
+          </p:cNvPr>
+          <p:cNvPicPr>
+            <a:picLocks noChangeAspect="1"/>
+          </p:cNvPicPr>
+          <p:nvPr/>
+        </p:nvPicPr>
+        <p:blipFill>
+          <a:blip r:embed="rId3"/>
+          <a:stretch>
+            <a:fillRect/>
+          </a:stretch>
+        </p:blipFill>
+        <p:spPr>
+          <a:xfrm>
+            <a:off x="8778240" y="1255518"/>
+            <a:ext cx="3252395" cy="2388691"/>
+          </a:xfrm>
+          <a:prstGeom prst="rect">
+            <a:avLst/>
+          </a:prstGeom>
+        </p:spPr>
+      </p:pic>
+    </p:spTree>
+    <p:extLst>
+      <p:ext uri="{BB962C8B-B14F-4D97-AF65-F5344CB8AC3E}">
+        <p14:creationId xmlns:p14="http://schemas.microsoft.com/office/powerpoint/2010/main" val="3317880177"/>
+      </p:ext>
+    </p:extLst>
+  </p:cSld>
+  <p:clrMapOvr>
+    <a:masterClrMapping/>
+  </p:clrMapOvr>
+</p:sld>
+</file>
+
+<file path=ppt/slides/slide6.xml><?xml version="1.0" encoding="utf-8"?>
+<p:sld xmlns:a="http://schemas.openxmlformats.org/drawingml/2006/main" xmlns:r="http://schemas.openxmlformats.org/officeDocument/2006/relationships" xmlns:p="http://schemas.openxmlformats.org/presentationml/2006/main">
+  <p:cSld>
+    <p:spTree>
+      <p:nvGrpSpPr>
+        <p:cNvPr id="1" name=""/>
+        <p:cNvGrpSpPr/>
+        <p:nvPr/>
+      </p:nvGrpSpPr>
+      <p:grpSpPr>
+        <a:xfrm>
+          <a:off x="0" y="0"/>
+          <a:ext cx="0" cy="0"/>
+          <a:chOff x="0" y="0"/>
+          <a:chExt cx="0" cy="0"/>
+        </a:xfrm>
+      </p:grpSpPr>
+      <p:sp>
+        <p:nvSpPr>
+          <p:cNvPr id="2" name="SmartArt-Platzhalter 1">
+            <a:extLst>
+              <a:ext uri="{FF2B5EF4-FFF2-40B4-BE49-F238E27FC236}">
+                <a16:creationId xmlns:a16="http://schemas.microsoft.com/office/drawing/2014/main" id="{2CB4F665-72D5-04D0-9488-50863B509156}"/>
+              </a:ext>
+            </a:extLst>
+          </p:cNvPr>
+          <p:cNvSpPr>
+            <a:spLocks noGrp="1"/>
+          </p:cNvSpPr>
+          <p:nvPr>
+            <p:ph type="dgm" sz="quarter" idx="15"/>
+          </p:nvPr>
+        </p:nvSpPr>
+        <p:spPr/>
+        <p:txBody>
+          <a:bodyPr/>
+          <a:lstStyle/>
+          <a:p>
+            <a:r>
+              <a:rPr lang="de-DE" dirty="0"/>
+              <a:t>Vor:</a:t>
+            </a:r>
+          </a:p>
+          <a:p>
+            <a:pPr lvl="1"/>
+            <a:r>
+              <a:rPr lang="de-DE" dirty="0"/>
+              <a:t>Einfache Umsetzung</a:t>
+            </a:r>
+          </a:p>
+          <a:p>
+            <a:pPr lvl="1"/>
+            <a:r>
+              <a:rPr lang="de-DE" dirty="0"/>
+              <a:t>Klare Nachrichten (mit GUI)</a:t>
+            </a:r>
+          </a:p>
+          <a:p>
+            <a:r>
+              <a:rPr lang="de-DE" dirty="0"/>
+              <a:t>Einschränkungen:</a:t>
+            </a:r>
+          </a:p>
+          <a:p>
+            <a:pPr lvl="1"/>
+            <a:r>
+              <a:rPr lang="de-DE" dirty="0"/>
+              <a:t>nicht verschlüsselt (einfach versteckt)</a:t>
+            </a:r>
+          </a:p>
+          <a:p>
+            <a:pPr lvl="1"/>
+            <a:r>
+              <a:rPr lang="de-DE" dirty="0"/>
+              <a:t>Nicht </a:t>
+            </a:r>
+            <a:r>
+              <a:rPr lang="de-DE" dirty="0" err="1"/>
+              <a:t>gegeignet</a:t>
+            </a:r>
+            <a:r>
+              <a:rPr lang="de-DE" dirty="0"/>
+              <a:t> für komplizierte Bilder-</a:t>
+            </a:r>
+            <a:r>
+              <a:rPr lang="de-DE" dirty="0" err="1"/>
+              <a:t>Txyen</a:t>
+            </a:r>
+            <a:r>
+              <a:rPr lang="de-DE" dirty="0"/>
+              <a:t> (</a:t>
+            </a:r>
+            <a:r>
+              <a:rPr lang="de-DE" dirty="0" err="1"/>
+              <a:t>z.B</a:t>
+            </a:r>
+            <a:r>
+              <a:rPr lang="de-DE" dirty="0"/>
+              <a:t> JPEG)</a:t>
+            </a:r>
+          </a:p>
+        </p:txBody>
+      </p:sp>
+      <p:sp>
+        <p:nvSpPr>
+          <p:cNvPr id="3" name="Titel 2">
+            <a:extLst>
+              <a:ext uri="{FF2B5EF4-FFF2-40B4-BE49-F238E27FC236}">
+                <a16:creationId xmlns:a16="http://schemas.microsoft.com/office/drawing/2014/main" id="{454BDB9D-C2D3-C319-42C2-54115F4319A0}"/>
+              </a:ext>
+            </a:extLst>
+          </p:cNvPr>
+          <p:cNvSpPr>
+            <a:spLocks noGrp="1"/>
+          </p:cNvSpPr>
+          <p:nvPr>
+            <p:ph type="title"/>
+          </p:nvPr>
+        </p:nvSpPr>
+        <p:spPr/>
+        <p:txBody>
+          <a:bodyPr/>
+          <a:lstStyle/>
+          <a:p>
+            <a:r>
+              <a:rPr lang="de-DE" dirty="0"/>
+              <a:t>Vorteile und Nachteile</a:t>
+            </a:r>
+          </a:p>
+        </p:txBody>
+      </p:sp>
+      <p:sp>
+        <p:nvSpPr>
+          <p:cNvPr id="5" name="Fußzeilenplatzhalter 4">
+            <a:extLst>
+              <a:ext uri="{FF2B5EF4-FFF2-40B4-BE49-F238E27FC236}">
+                <a16:creationId xmlns:a16="http://schemas.microsoft.com/office/drawing/2014/main" id="{5E849679-4B57-94CF-9AF2-3CDDCB9CAA82}"/>
+              </a:ext>
+            </a:extLst>
+          </p:cNvPr>
+          <p:cNvSpPr>
+            <a:spLocks noGrp="1"/>
+          </p:cNvSpPr>
+          <p:nvPr>
+            <p:ph type="ftr" sz="quarter" idx="11"/>
+          </p:nvPr>
+        </p:nvSpPr>
+        <p:spPr/>
+        <p:txBody>
+          <a:bodyPr/>
+          <a:lstStyle/>
+          <a:p>
+            <a:r>
+              <a:rPr lang="de-DE" dirty="0"/>
+              <a:t>Steganographie</a:t>
+            </a:r>
+            <a:endParaRPr lang="de-DE" noProof="0" dirty="0"/>
+          </a:p>
+        </p:txBody>
+      </p:sp>
+      <p:sp>
+        <p:nvSpPr>
+          <p:cNvPr id="6" name="Foliennummernplatzhalter 5">
+            <a:extLst>
+              <a:ext uri="{FF2B5EF4-FFF2-40B4-BE49-F238E27FC236}">
+                <a16:creationId xmlns:a16="http://schemas.microsoft.com/office/drawing/2014/main" id="{D6639B89-152E-B2E6-16B9-3E2971DD5ED7}"/>
+              </a:ext>
+            </a:extLst>
+          </p:cNvPr>
+          <p:cNvSpPr>
+            <a:spLocks noGrp="1"/>
+          </p:cNvSpPr>
+          <p:nvPr>
+            <p:ph type="sldNum" sz="quarter" idx="12"/>
+          </p:nvPr>
+        </p:nvSpPr>
+        <p:spPr/>
+        <p:txBody>
+          <a:bodyPr/>
+          <a:lstStyle/>
+          <a:p>
+            <a:pPr rtl="0"/>
+            <a:fld id="{B5CEABB6-07DC-46E8-9B57-56EC44A396E5}" type="slidenum">
+              <a:rPr lang="de-DE" noProof="0" smtClean="0"/>
+              <a:t>6</a:t>
+            </a:fld>
+            <a:endParaRPr lang="de-DE" noProof="0"/>
+          </a:p>
+        </p:txBody>
+      </p:sp>
+    </p:spTree>
+    <p:extLst>
+      <p:ext uri="{BB962C8B-B14F-4D97-AF65-F5344CB8AC3E}">
+        <p14:creationId xmlns:p14="http://schemas.microsoft.com/office/powerpoint/2010/main" val="863713569"/>
+      </p:ext>
+    </p:extLst>
+  </p:cSld>
+  <p:clrMapOvr>
+    <a:masterClrMapping/>
+  </p:clrMapOvr>
+</p:sld>
+</file>
+
+<file path=ppt/slides/slide7.xml><?xml version="1.0" encoding="utf-8"?>
+<p:sld xmlns:a="http://schemas.openxmlformats.org/drawingml/2006/main" xmlns:r="http://schemas.openxmlformats.org/officeDocument/2006/relationships" xmlns:p="http://schemas.openxmlformats.org/presentationml/2006/main">
+  <p:cSld>
+    <p:spTree>
+      <p:nvGrpSpPr>
+        <p:cNvPr id="1" name=""/>
+        <p:cNvGrpSpPr/>
+        <p:nvPr/>
+      </p:nvGrpSpPr>
+      <p:grpSpPr>
+        <a:xfrm>
+          <a:off x="0" y="0"/>
+          <a:ext cx="0" cy="0"/>
+          <a:chOff x="0" y="0"/>
+          <a:chExt cx="0" cy="0"/>
+        </a:xfrm>
+      </p:grpSpPr>
+      <p:sp>
+        <p:nvSpPr>
+          <p:cNvPr id="2" name="SmartArt-Platzhalter 1">
+            <a:extLst>
+              <a:ext uri="{FF2B5EF4-FFF2-40B4-BE49-F238E27FC236}">
+                <a16:creationId xmlns:a16="http://schemas.microsoft.com/office/drawing/2014/main" id="{86D95F7A-7B31-2884-8A9B-B90E242C9B1B}"/>
+              </a:ext>
+            </a:extLst>
+          </p:cNvPr>
+          <p:cNvSpPr>
+            <a:spLocks noGrp="1"/>
+          </p:cNvSpPr>
+          <p:nvPr>
+            <p:ph type="dgm" sz="quarter" idx="15"/>
+          </p:nvPr>
+        </p:nvSpPr>
+        <p:spPr/>
+        <p:txBody>
+          <a:bodyPr/>
+          <a:lstStyle/>
+          <a:p>
+            <a:r>
+              <a:rPr lang="de-DE" dirty="0"/>
+              <a:t>Steganographie ist eine simple und perfekte Methode zum Verstecken von Daten in Bildern</a:t>
+            </a:r>
+          </a:p>
+          <a:p>
+            <a:r>
+              <a:rPr lang="de-DE" dirty="0"/>
+              <a:t>Mit einer geeigneten Programmiersprache (hier Python9 lässt sich diese Methode schnell umsetzen.</a:t>
+            </a:r>
+          </a:p>
+          <a:p>
+            <a:r>
+              <a:rPr lang="de-DE" dirty="0"/>
+              <a:t>Guten Methode für IT-Sicherheit</a:t>
+            </a:r>
+          </a:p>
+        </p:txBody>
+      </p:sp>
+      <p:sp>
+        <p:nvSpPr>
+          <p:cNvPr id="3" name="Titel 2">
+            <a:extLst>
+              <a:ext uri="{FF2B5EF4-FFF2-40B4-BE49-F238E27FC236}">
+                <a16:creationId xmlns:a16="http://schemas.microsoft.com/office/drawing/2014/main" id="{69B2292B-BA38-F63A-0D4E-7E58F414EC48}"/>
+              </a:ext>
+            </a:extLst>
+          </p:cNvPr>
+          <p:cNvSpPr>
+            <a:spLocks noGrp="1"/>
+          </p:cNvSpPr>
+          <p:nvPr>
+            <p:ph type="title"/>
+          </p:nvPr>
+        </p:nvSpPr>
+        <p:spPr/>
+        <p:txBody>
+          <a:bodyPr/>
+          <a:lstStyle/>
+          <a:p>
+            <a:r>
+              <a:rPr lang="de-DE" dirty="0"/>
+              <a:t>Fazit</a:t>
+            </a:r>
+          </a:p>
+        </p:txBody>
+      </p:sp>
+      <p:sp>
+        <p:nvSpPr>
+          <p:cNvPr id="5" name="Fußzeilenplatzhalter 4">
+            <a:extLst>
+              <a:ext uri="{FF2B5EF4-FFF2-40B4-BE49-F238E27FC236}">
+                <a16:creationId xmlns:a16="http://schemas.microsoft.com/office/drawing/2014/main" id="{2C1E7068-1520-8DE0-EB67-7D5C938BDCA5}"/>
+              </a:ext>
+            </a:extLst>
+          </p:cNvPr>
+          <p:cNvSpPr>
+            <a:spLocks noGrp="1"/>
+          </p:cNvSpPr>
+          <p:nvPr>
+            <p:ph type="ftr" sz="quarter" idx="11"/>
+          </p:nvPr>
+        </p:nvSpPr>
+        <p:spPr/>
+        <p:txBody>
+          <a:bodyPr/>
+          <a:lstStyle/>
+          <a:p>
+            <a:r>
+              <a:rPr lang="de-DE" dirty="0"/>
+              <a:t>Steganographie</a:t>
+            </a:r>
+            <a:endParaRPr lang="de-DE" noProof="0" dirty="0"/>
+          </a:p>
+        </p:txBody>
+      </p:sp>
+      <p:sp>
+        <p:nvSpPr>
+          <p:cNvPr id="6" name="Foliennummernplatzhalter 5">
+            <a:extLst>
+              <a:ext uri="{FF2B5EF4-FFF2-40B4-BE49-F238E27FC236}">
+                <a16:creationId xmlns:a16="http://schemas.microsoft.com/office/drawing/2014/main" id="{4B082C00-CB6A-7F6A-8A83-8671FB7F0852}"/>
+              </a:ext>
+            </a:extLst>
+          </p:cNvPr>
+          <p:cNvSpPr>
+            <a:spLocks noGrp="1"/>
+          </p:cNvSpPr>
+          <p:nvPr>
+            <p:ph type="sldNum" sz="quarter" idx="12"/>
+          </p:nvPr>
+        </p:nvSpPr>
+        <p:spPr/>
+        <p:txBody>
+          <a:bodyPr/>
+          <a:lstStyle/>
+          <a:p>
+            <a:pPr rtl="0"/>
+            <a:fld id="{B5CEABB6-07DC-46E8-9B57-56EC44A396E5}" type="slidenum">
+              <a:rPr lang="de-DE" noProof="0" smtClean="0"/>
+              <a:t>7</a:t>
+            </a:fld>
+            <a:endParaRPr lang="de-DE" noProof="0"/>
+          </a:p>
+        </p:txBody>
+      </p:sp>
+    </p:spTree>
+    <p:extLst>
+      <p:ext uri="{BB962C8B-B14F-4D97-AF65-F5344CB8AC3E}">
+        <p14:creationId xmlns:p14="http://schemas.microsoft.com/office/powerpoint/2010/main" val="2707875432"/>
+      </p:ext>
+    </p:extLst>
+  </p:cSld>
+  <p:clrMapOvr>
+    <a:masterClrMapping/>
+  </p:clrMapOvr>
+</p:sld>
+</file>
+
+<file path=ppt/slides/slide8.xml><?xml version="1.0" encoding="utf-8"?>
+<p:sld xmlns:a="http://schemas.openxmlformats.org/drawingml/2006/main" xmlns:r="http://schemas.openxmlformats.org/officeDocument/2006/relationships" xmlns:p="http://schemas.openxmlformats.org/presentationml/2006/main">
+  <p:cSld>
+    <p:spTree>
+      <p:nvGrpSpPr>
+        <p:cNvPr id="1" name=""/>
+        <p:cNvGrpSpPr/>
+        <p:nvPr/>
+      </p:nvGrpSpPr>
+      <p:grpSpPr>
+        <a:xfrm>
+          <a:off x="0" y="0"/>
+          <a:ext cx="0" cy="0"/>
+          <a:chOff x="0" y="0"/>
+          <a:chExt cx="0" cy="0"/>
+        </a:xfrm>
+      </p:grpSpPr>
+      <p:sp>
+        <p:nvSpPr>
           <p:cNvPr id="2" name="Titel 1">
             <a:extLst>
               <a:ext uri="{FF2B5EF4-FFF2-40B4-BE49-F238E27FC236}">
@@ -17224,68 +17764,33 @@
       </p:sp>
       <p:sp>
         <p:nvSpPr>
-          <p:cNvPr id="4" name="Datumsplatzhalter 3">
-            <a:extLst>
-              <a:ext uri="{FF2B5EF4-FFF2-40B4-BE49-F238E27FC236}">
-                <a16:creationId xmlns:a16="http://schemas.microsoft.com/office/drawing/2014/main" id="{72DA7980-C870-4C9A-84FA-4120D8AF5DE8}"/>
-              </a:ext>
-            </a:extLst>
-          </p:cNvPr>
-          <p:cNvSpPr>
-            <a:spLocks noGrp="1"/>
-          </p:cNvSpPr>
-          <p:nvPr>
-            <p:ph type="dt" sz="half" idx="10"/>
-          </p:nvPr>
-        </p:nvSpPr>
-        <p:spPr>
-          <a:xfrm>
-            <a:off x="4267200" y="6356350"/>
-            <a:ext cx="1774371" cy="365125"/>
+          <p:cNvPr id="5" name="Fußzeilenplatzhalter 4">
+            <a:extLst>
+              <a:ext uri="{FF2B5EF4-FFF2-40B4-BE49-F238E27FC236}">
+                <a16:creationId xmlns:a16="http://schemas.microsoft.com/office/drawing/2014/main" id="{0DFADE42-1A3F-40C8-A071-E57644F3D843}"/>
+              </a:ext>
+            </a:extLst>
+          </p:cNvPr>
+          <p:cNvSpPr>
+            <a:spLocks noGrp="1"/>
+          </p:cNvSpPr>
+          <p:nvPr>
+            <p:ph type="ftr" sz="quarter" idx="11"/>
+          </p:nvPr>
+        </p:nvSpPr>
+        <p:spPr>
+          <a:xfrm>
+            <a:off x="6479721" y="6356350"/>
+            <a:ext cx="2661557" cy="365125"/>
           </a:xfrm>
         </p:spPr>
         <p:txBody>
           <a:bodyPr rtlCol="0"/>
           <a:lstStyle/>
           <a:p>
-            <a:pPr rtl="0"/>
-            <a:r>
-              <a:rPr lang="de-DE"/>
-              <a:t>20XX</a:t>
-            </a:r>
-          </a:p>
-        </p:txBody>
-      </p:sp>
-      <p:sp>
-        <p:nvSpPr>
-          <p:cNvPr id="5" name="Fußzeilenplatzhalter 4">
-            <a:extLst>
-              <a:ext uri="{FF2B5EF4-FFF2-40B4-BE49-F238E27FC236}">
-                <a16:creationId xmlns:a16="http://schemas.microsoft.com/office/drawing/2014/main" id="{0DFADE42-1A3F-40C8-A071-E57644F3D843}"/>
-              </a:ext>
-            </a:extLst>
-          </p:cNvPr>
-          <p:cNvSpPr>
-            <a:spLocks noGrp="1"/>
-          </p:cNvSpPr>
-          <p:nvPr>
-            <p:ph type="ftr" sz="quarter" idx="11"/>
-          </p:nvPr>
-        </p:nvSpPr>
-        <p:spPr>
-          <a:xfrm>
-            <a:off x="6479721" y="6356350"/>
-            <a:ext cx="2661557" cy="365125"/>
-          </a:xfrm>
-        </p:spPr>
-        <p:txBody>
-          <a:bodyPr rtlCol="0"/>
-          <a:lstStyle/>
-          <a:p>
-            <a:pPr rtl="0"/>
-            <a:r>
-              <a:rPr lang="de-DE"/>
-              <a:t>Verkaufspräsentation</a:t>
+            <a:r>
+              <a:rPr lang="de-DE" dirty="0"/>
+              <a:t>Steganographie</a:t>
             </a:r>
           </a:p>
         </p:txBody>
@@ -17320,7 +17825,7 @@
             <a:fld id="{B5CEABB6-07DC-46E8-9B57-56EC44A396E5}" type="slidenum">
               <a:rPr lang="de-DE" smtClean="0"/>
               <a:pPr rtl="0"/>
-              <a:t>5</a:t>
+              <a:t>8</a:t>
             </a:fld>
             <a:endParaRPr lang="de-DE"/>
           </a:p>
@@ -18131,6 +18636,15 @@
 </file>
 
 <file path=customXml/item1.xml><?xml version="1.0" encoding="utf-8"?>
+<?mso-contentType ?>
+<FormTemplates xmlns="http://schemas.microsoft.com/sharepoint/v3/contenttype/forms">
+  <Display>DocumentLibraryForm</Display>
+  <Edit>DocumentLibraryForm</Edit>
+  <New>DocumentLibraryForm</New>
+</FormTemplates>
+</file>
+
+<file path=customXml/item2.xml><?xml version="1.0" encoding="utf-8"?>
 <ct:contentTypeSchema xmlns:ct="http://schemas.microsoft.com/office/2006/metadata/contentType" xmlns:ma="http://schemas.microsoft.com/office/2006/metadata/properties/metaAttributes" ct:_="" ma:_="" ma:contentTypeName="Document" ma:contentTypeID="0x01010079F111ED35F8CC479449609E8A0923A6" ma:contentTypeVersion="20" ma:contentTypeDescription="Create a new document." ma:contentTypeScope="" ma:versionID="1267097ee5f5874adfcc408041ae252e">
   <xsd:schema xmlns:xsd="http://www.w3.org/2001/XMLSchema" xmlns:xs="http://www.w3.org/2001/XMLSchema" xmlns:p="http://schemas.microsoft.com/office/2006/metadata/properties" xmlns:ns1="http://schemas.microsoft.com/sharepoint/v3" xmlns:ns2="71af3243-3dd4-4a8d-8c0d-dd76da1f02a5" xmlns:ns3="16c05727-aa75-4e4a-9b5f-8a80a1165891" xmlns:ns4="230e9df3-be65-4c73-a93b-d1236ebd677e" targetNamespace="http://schemas.microsoft.com/office/2006/metadata/properties" ma:root="true" ma:fieldsID="395891a93df65b14727750f2c06c306c" ns1:_="" ns2:_="" ns3:_="" ns4:_="">
     <xsd:import namespace="http://schemas.microsoft.com/sharepoint/v3"/>
@@ -18406,15 +18920,6 @@
 </ct:contentTypeSchema>
 </file>
 
-<file path=customXml/item2.xml><?xml version="1.0" encoding="utf-8"?>
-<?mso-contentType ?>
-<FormTemplates xmlns="http://schemas.microsoft.com/sharepoint/v3/contenttype/forms">
-  <Display>DocumentLibraryForm</Display>
-  <Edit>DocumentLibraryForm</Edit>
-  <New>DocumentLibraryForm</New>
-</FormTemplates>
-</file>
-
 <file path=customXml/item3.xml><?xml version="1.0" encoding="utf-8"?>
 <p:properties xmlns:p="http://schemas.microsoft.com/office/2006/metadata/properties" xmlns:xsi="http://www.w3.org/2001/XMLSchema-instance" xmlns:pc="http://schemas.microsoft.com/office/infopath/2007/PartnerControls">
   <documentManagement>
@@ -18435,6 +18940,14 @@
 </file>
 
 <file path=customXml/itemProps1.xml><?xml version="1.0" encoding="utf-8"?>
+<ds:datastoreItem xmlns:ds="http://schemas.openxmlformats.org/officeDocument/2006/customXml" ds:itemID="{42BC90D6-94CF-42F7-AAC4-9CF6824C54D5}">
+  <ds:schemaRefs>
+    <ds:schemaRef ds:uri="http://schemas.microsoft.com/sharepoint/v3/contenttype/forms"/>
+  </ds:schemaRefs>
+</ds:datastoreItem>
+</file>
+
+<file path=customXml/itemProps2.xml><?xml version="1.0" encoding="utf-8"?>
 <ds:datastoreItem xmlns:ds="http://schemas.openxmlformats.org/officeDocument/2006/customXml" ds:itemID="{64CF2EF3-001F-4BE9-81B3-86ECBBF9425F}">
   <ds:schemaRefs>
     <ds:schemaRef ds:uri="http://schemas.microsoft.com/office/2006/metadata/contentType"/>
@@ -18451,14 +18964,6 @@
     <ds:schemaRef ds:uri="http://purl.org/dc/elements/1.1/"/>
     <ds:schemaRef ds:uri="http://purl.org/dc/terms/"/>
     <ds:schemaRef ds:uri="http://schemas.microsoft.com/internal/obd"/>
-  </ds:schemaRefs>
-</ds:datastoreItem>
-</file>
-
-<file path=customXml/itemProps2.xml><?xml version="1.0" encoding="utf-8"?>
-<ds:datastoreItem xmlns:ds="http://schemas.openxmlformats.org/officeDocument/2006/customXml" ds:itemID="{42BC90D6-94CF-42F7-AAC4-9CF6824C54D5}">
-  <ds:schemaRefs>
-    <ds:schemaRef ds:uri="http://schemas.microsoft.com/sharepoint/v3/contenttype/forms"/>
   </ds:schemaRefs>
 </ds:datastoreItem>
 </file>

</xml_diff>